<commit_message>
issues de ficha técnica
</commit_message>
<xml_diff>
--- a/obras/static/ppt/ppt-generados/FichaTecnicaObras_1.pptx
+++ b/obras/static/ppt/ppt-generados/FichaTecnicaObras_1.pptx
@@ -5372,7 +5372,7 @@
               <a:defRPr sz="800"/>
             </a:pPr>
             <a:r>
-              <a:t>OB_SEGOB_00002</a:t>
+              <a:t>OB_SEGOB_00010</a:t>
             </a:r>
             <a:endParaRPr lang="es-MX" sz="800" dirty="0">
               <a:latin typeface="Arial Narrow" panose="020B0606020202030204" pitchFamily="34" charset="0"/>
@@ -5474,7 +5474,7 @@
               <a:defRPr sz="800"/>
             </a:pPr>
             <a:r>
-              <a:t>CHIAPAS</a:t>
+              <a:t>INTERESTATAL</a:t>
             </a:r>
             <a:endParaRPr lang="es-MX" sz="800" dirty="0">
               <a:latin typeface="Arial Narrow" panose="020B0606020202030204" pitchFamily="34" charset="0"/>
@@ -5542,7 +5542,7 @@
               <a:defRPr sz="800"/>
             </a:pPr>
             <a:r>
-              <a:t>2013-11-01</a:t>
+              <a:t>2013-10-01</a:t>
             </a:r>
             <a:endParaRPr lang="es-MX" sz="800" dirty="0">
               <a:latin typeface="Arial Narrow" panose="020B0606020202030204" pitchFamily="34" charset="0"/>
@@ -5576,7 +5576,7 @@
               <a:defRPr sz="800"/>
             </a:pPr>
             <a:r>
-              <a:t>2014-01-01</a:t>
+              <a:t>2013-12-01</a:t>
             </a:r>
             <a:endParaRPr lang="es-MX" sz="800" dirty="0">
               <a:latin typeface="Arial Narrow" panose="020B0606020202030204" pitchFamily="34" charset="0"/>
@@ -5950,7 +5950,7 @@
               <a:defRPr sz="800"/>
             </a:pPr>
             <a:r>
-              <a:t>12.71</a:t>
+              <a:t>8.18</a:t>
             </a:r>
             <a:endParaRPr lang="es-MX" sz="800" dirty="0">
               <a:latin typeface="Arial Narrow" panose="020B0606020202030204" pitchFamily="34" charset="0"/>
@@ -6360,7 +6360,7 @@
               <a:defRPr sz="800"/>
             </a:pPr>
             <a:r>
-              <a:t>MANTENIMIENTO MAYOR A INMUEBLES DE LA DELEGACION FEDERAL DEL INM EN CASA ROJA, UNION JUAREZ, TAPACHULA -GRUPO BETA -REGULACION DE ESTANCIA EN EL ESTADO DE CHIAPAS</a:t>
+              <a:t>MANTENIMIENTO MAYOR A INMUEBLES DE LA DELEGACION FEDERAL DEL INM EN EL ESTADO DE QUINTANA ROO Y TABASCO</a:t>
             </a:r>
             <a:endParaRPr lang="es-MX" sz="800" dirty="0">
               <a:latin typeface="Arial Narrow" panose="020B0606020202030204" pitchFamily="34" charset="0"/>
@@ -6394,7 +6394,7 @@
               <a:defRPr sz="800"/>
             </a:pPr>
             <a:r>
-              <a:t>TRAMITES MIGRATORIOS: 165,475 EXTRANJEROS PRESENTADOS ANTE EL INM: 5,359</a:t>
+              <a:t>TRAMITES MIGRATORIOS: 2488,885 EXTRANJEROS PRESENTADOS ANTE EL INM: 3,461</a:t>
             </a:r>
             <a:endParaRPr lang="es-MX" sz="800" dirty="0">
               <a:latin typeface="Arial Narrow" panose="020B0606020202030204" pitchFamily="34" charset="0"/>

</xml_diff>

<commit_message>
issue 15, ficha técnica nueva terminada
</commit_message>
<xml_diff>
--- a/obras/static/ppt/ppt-generados/FichaTecnicaObras_1.pptx
+++ b/obras/static/ppt/ppt-generados/FichaTecnicaObras_1.pptx
@@ -6781,7 +6781,7 @@
               <a:defRPr sz="800"/>
             </a:pPr>
             <a:r>
-              <a:t>OB_CDI_00004</a:t>
+              <a:t>OB-CFE-001</a:t>
             </a:r>
             <a:endParaRPr lang="es-MX" sz="800" dirty="0">
               <a:latin typeface="Arial Narrow" panose="020B0606020202030204" pitchFamily="34" charset="0"/>
@@ -6815,7 +6815,7 @@
               <a:defRPr sz="800"/>
             </a:pPr>
             <a:r>
-              <a:t>CONSTRUCCION DE CAMINO</a:t>
+              <a:t>obra de usuario CFE</a:t>
             </a:r>
             <a:endParaRPr lang="es-MX" sz="600" dirty="0">
               <a:latin typeface="Arial Narrow" panose="020B0606020202030204" pitchFamily="34" charset="0"/>
@@ -6849,7 +6849,7 @@
               <a:defRPr sz="800"/>
             </a:pPr>
             <a:r>
-              <a:t>CDI</a:t>
+              <a:t>CFE</a:t>
             </a:r>
             <a:endParaRPr lang="es-MX" sz="800" dirty="0">
               <a:latin typeface="Arial Narrow" panose="020B0606020202030204" pitchFamily="34" charset="0"/>
@@ -6883,7 +6883,7 @@
               <a:defRPr sz="800"/>
             </a:pPr>
             <a:r>
-              <a:t>BAJA CALIFORNIA</a:t>
+              <a:t>MEXICO</a:t>
             </a:r>
             <a:endParaRPr lang="es-MX" sz="800" dirty="0">
               <a:latin typeface="Arial Narrow" panose="020B0606020202030204" pitchFamily="34" charset="0"/>
@@ -6917,7 +6917,7 @@
               <a:defRPr sz="800"/>
             </a:pPr>
             <a:r>
-              <a:t>ENSENADA</a:t>
+              <a:t>TOLUCA</a:t>
             </a:r>
             <a:endParaRPr lang="es-MX" sz="800" dirty="0">
               <a:latin typeface="Arial Narrow" panose="020B0606020202030204" pitchFamily="34" charset="0"/>
@@ -6951,7 +6951,7 @@
               <a:defRPr sz="800"/>
             </a:pPr>
             <a:r>
-              <a:t>2013-07-01</a:t>
+              <a:t>2015-01-07</a:t>
             </a:r>
             <a:endParaRPr lang="es-MX" sz="800" dirty="0">
               <a:latin typeface="Arial Narrow" panose="020B0606020202030204" pitchFamily="34" charset="0"/>
@@ -6985,7 +6985,7 @@
               <a:defRPr sz="800"/>
             </a:pPr>
             <a:r>
-              <a:t>2013-11-01</a:t>
+              <a:t>2015-06-07</a:t>
             </a:r>
             <a:endParaRPr lang="es-MX" sz="800" dirty="0">
               <a:latin typeface="Arial Narrow" panose="020B0606020202030204" pitchFamily="34" charset="0"/>
@@ -7019,7 +7019,7 @@
               <a:defRPr sz="800"/>
             </a:pPr>
             <a:r>
-              <a:t>CONCLUIDAS</a:t>
+              <a:t>PROCESO</a:t>
             </a:r>
             <a:endParaRPr lang="es-MX" sz="800" dirty="0">
               <a:latin typeface="Arial Narrow" panose="020B0606020202030204" pitchFamily="34" charset="0"/>
@@ -7053,7 +7053,7 @@
               <a:defRPr sz="800"/>
             </a:pPr>
             <a:r>
-              <a:t>100.0</a:t>
+              <a:t>10.0</a:t>
             </a:r>
             <a:endParaRPr lang="es-MX" sz="800" dirty="0">
               <a:latin typeface="Arial Narrow" panose="020B0606020202030204" pitchFamily="34" charset="0"/>
@@ -7087,7 +7087,7 @@
               <a:defRPr sz="800"/>
             </a:pPr>
             <a:r>
-              <a:t>2015-05-29 13:12:08+00:00</a:t>
+              <a:t>2015-07-18 17:24:01+00:00</a:t>
             </a:r>
             <a:endParaRPr lang="es-MX" sz="800" dirty="0">
               <a:latin typeface="Arial Narrow" panose="020B0606020202030204" pitchFamily="34" charset="0"/>
@@ -7155,7 +7155,7 @@
               <a:defRPr sz="800"/>
             </a:pPr>
             <a:r>
-              <a:t>Si</a:t>
+              <a:t>No</a:t>
             </a:r>
             <a:endParaRPr lang="es-MX" sz="800" dirty="0">
               <a:latin typeface="Arial Narrow" panose="020B0606020202030204" pitchFamily="34" charset="0"/>
@@ -7189,7 +7189,7 @@
               <a:defRPr sz="800"/>
             </a:pPr>
             <a:r>
-              <a:t>Si</a:t>
+              <a:t>No</a:t>
             </a:r>
             <a:endParaRPr lang="es-MX" sz="800" dirty="0">
               <a:latin typeface="Arial Narrow" panose="020B0606020202030204" pitchFamily="34" charset="0"/>
@@ -7223,7 +7223,7 @@
               <a:defRPr sz="800"/>
             </a:pPr>
             <a:r>
-              <a:t>Si</a:t>
+              <a:t>No</a:t>
             </a:r>
             <a:endParaRPr lang="es-MX" sz="800" dirty="0">
               <a:latin typeface="Arial Narrow" panose="020B0606020202030204" pitchFamily="34" charset="0"/>
@@ -7257,7 +7257,7 @@
               <a:defRPr sz="800"/>
             </a:pPr>
             <a:r>
-              <a:t>Si</a:t>
+              <a:t>No</a:t>
             </a:r>
             <a:endParaRPr lang="es-MX" sz="800" dirty="0">
               <a:latin typeface="Arial Narrow" panose="020B0606020202030204" pitchFamily="34" charset="0"/>
@@ -7291,7 +7291,7 @@
               <a:defRPr sz="800"/>
             </a:pPr>
             <a:r>
-              <a:t>Si</a:t>
+              <a:t>No</a:t>
             </a:r>
             <a:endParaRPr lang="es-MX" sz="800" dirty="0">
               <a:latin typeface="Arial Narrow" panose="020B0606020202030204" pitchFamily="34" charset="0"/>
@@ -7359,7 +7359,7 @@
               <a:defRPr sz="800"/>
             </a:pPr>
             <a:r>
-              <a:t>3.45</a:t>
+              <a:t>15.0</a:t>
             </a:r>
             <a:endParaRPr lang="es-MX" sz="800" dirty="0">
               <a:latin typeface="Arial Narrow" panose="020B0606020202030204" pitchFamily="34" charset="0"/>
@@ -7427,7 +7427,7 @@
               <a:defRPr sz="800"/>
             </a:pPr>
             <a:r>
-              <a:t>HABITANTES</a:t>
+              <a:t>Toluca</a:t>
             </a:r>
             <a:endParaRPr lang="es-MX" sz="800" dirty="0">
               <a:latin typeface="Arial Narrow" panose="020B0606020202030204" pitchFamily="34" charset="0"/>
@@ -7461,7 +7461,7 @@
               <a:defRPr sz="800"/>
             </a:pPr>
             <a:r>
-              <a:t>MUNICIPAL</a:t>
+              <a:t>NACIONAL</a:t>
             </a:r>
             <a:endParaRPr lang="es-MX" sz="800" dirty="0">
               <a:latin typeface="Arial Narrow" panose="020B0606020202030204" pitchFamily="34" charset="0"/>
@@ -7529,7 +7529,7 @@
               <a:defRPr sz="800"/>
             </a:pPr>
             <a:r>
-              <a:t>No</a:t>
+              <a:t>Si</a:t>
             </a:r>
             <a:endParaRPr lang="es-MX" sz="800" dirty="0">
               <a:latin typeface="Arial Narrow" panose="020B0606020202030204" pitchFamily="34" charset="0"/>
@@ -7559,12 +7559,11 @@
           </a:bodyPr>
           <a:lstStyle/>
           <a:p>
-            <a:r>
-              <a:rPr lang="es-MX" sz="800" smtClean="0">
-                <a:latin typeface="Arial Narrow" panose="020B0606020202030204" pitchFamily="34" charset="0"/>
-                <a:cs typeface="Angsana New" panose="02020603050405020304" pitchFamily="18" charset="-34"/>
-              </a:rPr>
-              <a:t>x</a:t>
+            <a:pPr>
+              <a:defRPr sz="800"/>
+            </a:pPr>
+            <a:r>
+              <a:t>CG002</a:t>
             </a:r>
             <a:endParaRPr lang="es-MX" sz="800" dirty="0">
               <a:latin typeface="Arial Narrow" panose="020B0606020202030204" pitchFamily="34" charset="0"/>
@@ -7667,7 +7666,7 @@
               <a:defRPr sz="800"/>
             </a:pPr>
             <a:r>
-              <a:t>No</a:t>
+              <a:t>Si</a:t>
             </a:r>
             <a:endParaRPr lang="es-MX" sz="800" dirty="0">
               <a:latin typeface="Arial Narrow" panose="020B0606020202030204" pitchFamily="34" charset="0"/>
@@ -7701,7 +7700,7 @@
               <a:defRPr sz="800"/>
             </a:pPr>
             <a:r>
-              <a:t>Si</a:t>
+              <a:t>No</a:t>
             </a:r>
             <a:endParaRPr lang="es-MX" sz="800" dirty="0">
               <a:latin typeface="Arial Narrow" panose="020B0606020202030204" pitchFamily="34" charset="0"/>
@@ -7769,7 +7768,7 @@
               <a:defRPr sz="800"/>
             </a:pPr>
             <a:r>
-              <a:t>1.-TERRACERIA 2.-OBRA COMPLEMENTARIA (CUNETA Y BORDILLO) 3.-PAVIMENTACION (CONCRETO HIDRAUILICO) 4.-SEÑALAMIENTO VERTICAL Y HORIZONTAL</a:t>
+              <a:t>obra de prueba para probar usuario CFE</a:t>
             </a:r>
             <a:endParaRPr lang="es-MX" sz="800" dirty="0">
               <a:latin typeface="Arial Narrow" panose="020B0606020202030204" pitchFamily="34" charset="0"/>
@@ -7803,7 +7802,7 @@
               <a:defRPr sz="800"/>
             </a:pPr>
             <a:r>
-              <a:t>N/A</a:t>
+              <a:t>prueba</a:t>
             </a:r>
             <a:endParaRPr lang="es-MX" sz="800" dirty="0">
               <a:latin typeface="Arial Narrow" panose="020B0606020202030204" pitchFamily="34" charset="0"/>
@@ -8155,7 +8154,7 @@
       </p:pic>
       <p:pic>
         <p:nvPicPr>
-          <p:cNvPr id="28" name="Picture 27" descr="CDI.jpg"/>
+          <p:cNvPr id="28" name="Picture 27" descr="CFE.jpg"/>
           <p:cNvPicPr>
             <a:picLocks noChangeAspect="1"/>
           </p:cNvPicPr>
@@ -8171,6 +8170,78 @@
           <a:xfrm>
             <a:off x="365760" y="914400"/>
             <a:ext cx="2667000" cy="914400"/>
+          </a:xfrm>
+          <a:prstGeom prst="rect">
+            <a:avLst/>
+          </a:prstGeom>
+        </p:spPr>
+      </p:pic>
+      <p:pic>
+        <p:nvPicPr>
+          <p:cNvPr id="45" name="Picture 44" descr="OB-CFE-001_ANTES.jpg"/>
+          <p:cNvPicPr>
+            <a:picLocks noChangeAspect="1"/>
+          </p:cNvPicPr>
+          <p:nvPr/>
+        </p:nvPicPr>
+        <p:blipFill>
+          <a:blip r:embed="rId11"/>
+          <a:stretch>
+            <a:fillRect/>
+          </a:stretch>
+        </p:blipFill>
+        <p:spPr>
+          <a:xfrm>
+            <a:off x="6473952" y="5422392"/>
+            <a:ext cx="694944" cy="713232"/>
+          </a:xfrm>
+          <a:prstGeom prst="rect">
+            <a:avLst/>
+          </a:prstGeom>
+        </p:spPr>
+      </p:pic>
+      <p:pic>
+        <p:nvPicPr>
+          <p:cNvPr id="46" name="Picture 45" descr="OB-CFE-001_DURANTE.JPG"/>
+          <p:cNvPicPr>
+            <a:picLocks noChangeAspect="1"/>
+          </p:cNvPicPr>
+          <p:nvPr/>
+        </p:nvPicPr>
+        <p:blipFill>
+          <a:blip r:embed="rId12"/>
+          <a:stretch>
+            <a:fillRect/>
+          </a:stretch>
+        </p:blipFill>
+        <p:spPr>
+          <a:xfrm>
+            <a:off x="7250369" y="5422392"/>
+            <a:ext cx="694944" cy="713232"/>
+          </a:xfrm>
+          <a:prstGeom prst="rect">
+            <a:avLst/>
+          </a:prstGeom>
+        </p:spPr>
+      </p:pic>
+      <p:pic>
+        <p:nvPicPr>
+          <p:cNvPr id="47" name="Picture 46" descr="OB-CFE-001_DESPUES.JPG"/>
+          <p:cNvPicPr>
+            <a:picLocks noChangeAspect="1"/>
+          </p:cNvPicPr>
+          <p:nvPr/>
+        </p:nvPicPr>
+        <p:blipFill>
+          <a:blip r:embed="rId13"/>
+          <a:stretch>
+            <a:fillRect/>
+          </a:stretch>
+        </p:blipFill>
+        <p:spPr>
+          <a:xfrm>
+            <a:off x="8017184" y="5422392"/>
+            <a:ext cx="694944" cy="713232"/>
           </a:xfrm>
           <a:prstGeom prst="rect">
             <a:avLst/>

</xml_diff>

<commit_message>
filtro de tabla de obras, fechas y errores documentos
</commit_message>
<xml_diff>
--- a/obras/static/ppt/ppt-generados/FichaTecnicaObras_1.pptx
+++ b/obras/static/ppt/ppt-generados/FichaTecnicaObras_1.pptx
@@ -5372,7 +5372,7 @@
               <a:defRPr sz="800"/>
             </a:pPr>
             <a:r>
-              <a:t>OB_SEGOB_00010</a:t>
+              <a:t>OB_PEMEX_00949</a:t>
             </a:r>
             <a:endParaRPr lang="es-MX" sz="800" dirty="0">
               <a:latin typeface="Arial Narrow" panose="020B0606020202030204" pitchFamily="34" charset="0"/>
@@ -5406,7 +5406,7 @@
               <a:defRPr sz="800"/>
             </a:pPr>
             <a:r>
-              <a:t>ESTACION MIGRATORIA (INM)</a:t>
+              <a:t>CANCELADO POR AGRUPACION</a:t>
             </a:r>
             <a:endParaRPr lang="es-MX" sz="600" dirty="0">
               <a:latin typeface="Arial Narrow" panose="020B0606020202030204" pitchFamily="34" charset="0"/>
@@ -5440,7 +5440,7 @@
               <a:defRPr sz="800"/>
             </a:pPr>
             <a:r>
-              <a:t>SEGOB</a:t>
+              <a:t>PEMEX</a:t>
             </a:r>
             <a:endParaRPr lang="es-MX" sz="800" dirty="0">
               <a:latin typeface="Arial Narrow" panose="020B0606020202030204" pitchFamily="34" charset="0"/>
@@ -5474,7 +5474,7 @@
               <a:defRPr sz="800"/>
             </a:pPr>
             <a:r>
-              <a:t>INTERESTATAL</a:t>
+              <a:t>VERACRUZ</a:t>
             </a:r>
             <a:endParaRPr lang="es-MX" sz="800" dirty="0">
               <a:latin typeface="Arial Narrow" panose="020B0606020202030204" pitchFamily="34" charset="0"/>
@@ -5508,7 +5508,7 @@
               <a:defRPr sz="800"/>
             </a:pPr>
             <a:r>
-              <a:t>ESTATAL</a:t>
+              <a:t>N/A</a:t>
             </a:r>
             <a:endParaRPr lang="es-MX" sz="800" dirty="0">
               <a:latin typeface="Arial Narrow" panose="020B0606020202030204" pitchFamily="34" charset="0"/>
@@ -5542,7 +5542,7 @@
               <a:defRPr sz="800"/>
             </a:pPr>
             <a:r>
-              <a:t>2013-10-01</a:t>
+              <a:t>2013-01-01</a:t>
             </a:r>
             <a:endParaRPr lang="es-MX" sz="800" dirty="0">
               <a:latin typeface="Arial Narrow" panose="020B0606020202030204" pitchFamily="34" charset="0"/>
@@ -5610,7 +5610,7 @@
               <a:defRPr sz="800"/>
             </a:pPr>
             <a:r>
-              <a:t>CONCLUIDAS</a:t>
+              <a:t>CANCELADAS</a:t>
             </a:r>
             <a:endParaRPr lang="es-MX" sz="800" dirty="0">
               <a:latin typeface="Arial Narrow" panose="020B0606020202030204" pitchFamily="34" charset="0"/>
@@ -5678,7 +5678,7 @@
               <a:defRPr sz="800"/>
             </a:pPr>
             <a:r>
-              <a:t>2015-05-29 10:10:00+00:00</a:t>
+              <a:t>2014-11-04 15:26:15+00:00</a:t>
             </a:r>
             <a:endParaRPr lang="es-MX" sz="800" dirty="0">
               <a:latin typeface="Arial Narrow" panose="020B0606020202030204" pitchFamily="34" charset="0"/>
@@ -5712,7 +5712,7 @@
               <a:defRPr sz="800"/>
             </a:pPr>
             <a:r>
-              <a:t>Si</a:t>
+              <a:t>No</a:t>
             </a:r>
             <a:endParaRPr lang="es-MX" sz="800" dirty="0">
               <a:latin typeface="Arial Narrow" panose="020B0606020202030204" pitchFamily="34" charset="0"/>
@@ -5950,7 +5950,7 @@
               <a:defRPr sz="800"/>
             </a:pPr>
             <a:r>
-              <a:t>8.18</a:t>
+              <a:t>5.2</a:t>
             </a:r>
             <a:endParaRPr lang="es-MX" sz="800" dirty="0">
               <a:latin typeface="Arial Narrow" panose="020B0606020202030204" pitchFamily="34" charset="0"/>
@@ -6018,7 +6018,7 @@
               <a:defRPr sz="800"/>
             </a:pPr>
             <a:r>
-              <a:t>EXTRANJEROS</a:t>
+              <a:t>TODA LA POBLACION</a:t>
             </a:r>
             <a:endParaRPr lang="es-MX" sz="800" dirty="0">
               <a:latin typeface="Arial Narrow" panose="020B0606020202030204" pitchFamily="34" charset="0"/>
@@ -6326,7 +6326,7 @@
               <a:defRPr sz="800"/>
             </a:pPr>
             <a:r>
-              <a:t>Si</a:t>
+              <a:t>No</a:t>
             </a:r>
             <a:endParaRPr lang="es-MX" sz="800" dirty="0">
               <a:latin typeface="Arial Narrow" panose="020B0606020202030204" pitchFamily="34" charset="0"/>
@@ -6360,7 +6360,7 @@
               <a:defRPr sz="800"/>
             </a:pPr>
             <a:r>
-              <a:t>MANTENIMIENTO MAYOR A INMUEBLES DE LA DELEGACION FEDERAL DEL INM EN EL ESTADO DE QUINTANA ROO Y TABASCO</a:t>
+              <a:t>N/A</a:t>
             </a:r>
             <a:endParaRPr lang="es-MX" sz="800" dirty="0">
               <a:latin typeface="Arial Narrow" panose="020B0606020202030204" pitchFamily="34" charset="0"/>
@@ -6394,7 +6394,7 @@
               <a:defRPr sz="800"/>
             </a:pPr>
             <a:r>
-              <a:t>TRAMITES MIGRATORIOS: 2488,885 EXTRANJEROS PRESENTADOS ANTE EL INM: 3,461</a:t>
+              <a:t>SE AGRUPO EN PROYECTO</a:t>
             </a:r>
             <a:endParaRPr lang="es-MX" sz="800" dirty="0">
               <a:latin typeface="Arial Narrow" panose="020B0606020202030204" pitchFamily="34" charset="0"/>
@@ -6506,7 +6506,7 @@
       </p:sp>
       <p:pic>
         <p:nvPicPr>
-          <p:cNvPr id="45" name="Picture 44" descr="SEGOB.jpg"/>
+          <p:cNvPr id="45" name="Picture 44" descr="PEMEX.jpg"/>
           <p:cNvPicPr>
             <a:picLocks noChangeAspect="1"/>
           </p:cNvPicPr>

</xml_diff>